<commit_message>
Updated Assignment and Class 3 PPT
</commit_message>
<xml_diff>
--- a/PPTs/Python/Class 3.pptx
+++ b/PPTs/Python/Class 3.pptx
@@ -315,7 +315,7 @@
       </p15:sldGuideLst>
     </p:ext>
     <p:ext uri="http://customooxmlschemas.google.com/">
-      <go:slidesCustomData xmlns="" xmlns:mc="http://schemas.openxmlformats.org/markup-compatibility/2006" xmlns:mv="urn:schemas-microsoft-com:mac:vml" xmlns:c="http://schemas.openxmlformats.org/drawingml/2006/chart" xmlns:dgm="http://schemas.openxmlformats.org/drawingml/2006/diagram" xmlns:o="urn:schemas-microsoft-com:office:office" xmlns:v="urn:schemas-microsoft-com:vml" xmlns:pvml="urn:schemas-microsoft-com:office:powerpoint" xmlns:com="http://schemas.openxmlformats.org/drawingml/2006/compatibility" xmlns:p14="http://schemas.microsoft.com/office/powerpoint/2010/main" xmlns:p15="http://schemas.microsoft.com/office/powerpoint/2012/main" xmlns:ahyp="http://schemas.microsoft.com/office/drawing/2018/hyperlinkcolor" xmlns:go="http://customooxmlschemas.google.com/" r:id="rId51" roundtripDataSignature="AMtx7mgK15fYz8SJGXgtJROXieQdnfvUgQ=="/>
+      <go:slidesCustomData xmlns:go="http://customooxmlschemas.google.com/" xmlns:ahyp="http://schemas.microsoft.com/office/drawing/2018/hyperlinkcolor" xmlns:p15="http://schemas.microsoft.com/office/powerpoint/2012/main" xmlns:p14="http://schemas.microsoft.com/office/powerpoint/2010/main" xmlns:com="http://schemas.openxmlformats.org/drawingml/2006/compatibility" xmlns:pvml="urn:schemas-microsoft-com:office:powerpoint" xmlns:v="urn:schemas-microsoft-com:vml" xmlns:o="urn:schemas-microsoft-com:office:office" xmlns:dgm="http://schemas.openxmlformats.org/drawingml/2006/diagram" xmlns:c="http://schemas.openxmlformats.org/drawingml/2006/chart" xmlns:mv="urn:schemas-microsoft-com:mac:vml" xmlns:mc="http://schemas.openxmlformats.org/markup-compatibility/2006" xmlns="" r:id="rId51" roundtripDataSignature="AMtx7mgK15fYz8SJGXgtJROXieQdnfvUgQ=="/>
     </p:ext>
   </p:extLst>
 </p:presentation>
@@ -1661,8 +1661,8 @@
         </p:nvSpPr>
         <p:spPr>
           <a:xfrm>
-            <a:off x="1143225" y="685800"/>
-            <a:ext cx="4572225" cy="3429000"/>
+            <a:off x="1143000" y="685800"/>
+            <a:ext cx="4572000" cy="3429000"/>
           </a:xfrm>
           <a:custGeom>
             <a:avLst/>
@@ -15151,7 +15151,7 @@
         <p:spPr>
           <a:xfrm>
             <a:off x="0" y="0"/>
-            <a:ext cx="7848600" cy="3046988"/>
+            <a:ext cx="7848600" cy="3785611"/>
           </a:xfrm>
           <a:prstGeom prst="rect">
             <a:avLst/>
@@ -15167,7 +15167,7 @@
           </a:bodyPr>
           <a:lstStyle/>
           <a:p>
-            <a:pPr marL="0" marR="0" lvl="0" indent="0" algn="l" rtl="0">
+            <a:pPr marL="0" marR="0" lvl="0" indent="0" algn="ctr" rtl="0">
               <a:spcBef>
                 <a:spcPts val="0"/>
               </a:spcBef>
@@ -15177,9 +15177,9 @@
               <a:buNone/>
             </a:pPr>
             <a:r>
-              <a:rPr lang="en-US" sz="2400">
-                <a:solidFill>
-                  <a:schemeClr val="dk1"/>
+              <a:rPr lang="en-US" sz="4400" dirty="0">
+                <a:solidFill>
+                  <a:srgbClr val="FF0000"/>
                 </a:solidFill>
                 <a:latin typeface="Calibri"/>
                 <a:ea typeface="Calibri"/>
@@ -15188,7 +15188,11 @@
               </a:rPr>
               <a:t>Python For Loops</a:t>
             </a:r>
-            <a:endParaRPr/>
+            <a:endParaRPr sz="4400" dirty="0">
+              <a:solidFill>
+                <a:srgbClr val="FF0000"/>
+              </a:solidFill>
+            </a:endParaRPr>
           </a:p>
           <a:p>
             <a:pPr marL="0" marR="0" lvl="0" indent="0" algn="l" rtl="0">
@@ -15201,7 +15205,7 @@
               <a:buNone/>
             </a:pPr>
             <a:r>
-              <a:rPr lang="en-US" sz="2400">
+              <a:rPr lang="en-US" sz="2400" dirty="0">
                 <a:solidFill>
                   <a:schemeClr val="dk1"/>
                 </a:solidFill>
@@ -15212,7 +15216,6 @@
               </a:rPr>
               <a:t>A for loop is used for iterating over a sequence (that is either a list, a tuple, a dictionary, a set, or a string).</a:t>
             </a:r>
-            <a:endParaRPr/>
           </a:p>
           <a:p>
             <a:pPr marL="0" marR="0" lvl="0" indent="0" algn="l" rtl="0">
@@ -15224,8 +15227,20 @@
               </a:spcAft>
               <a:buNone/>
             </a:pPr>
-            <a:r>
-              <a:rPr lang="en-US" sz="2400">
+            <a:endParaRPr dirty="0"/>
+          </a:p>
+          <a:p>
+            <a:pPr marL="0" marR="0" lvl="0" indent="0" algn="l" rtl="0">
+              <a:spcBef>
+                <a:spcPts val="0"/>
+              </a:spcBef>
+              <a:spcAft>
+                <a:spcPts val="0"/>
+              </a:spcAft>
+              <a:buNone/>
+            </a:pPr>
+            <a:r>
+              <a:rPr lang="en-US" sz="2400" dirty="0">
                 <a:solidFill>
                   <a:schemeClr val="dk1"/>
                 </a:solidFill>
@@ -15236,7 +15251,6 @@
               </a:rPr>
               <a:t>This is less like the for keyword in other programming languages, and works more like an iterator method as found in other object-orientated programming languages.</a:t>
             </a:r>
-            <a:endParaRPr/>
           </a:p>
           <a:p>
             <a:pPr marL="0" marR="0" lvl="0" indent="0" algn="l" rtl="0">
@@ -15248,8 +15262,20 @@
               </a:spcAft>
               <a:buNone/>
             </a:pPr>
-            <a:r>
-              <a:rPr lang="en-US" sz="2400">
+            <a:endParaRPr dirty="0"/>
+          </a:p>
+          <a:p>
+            <a:pPr marL="0" marR="0" lvl="0" indent="0" algn="l" rtl="0">
+              <a:spcBef>
+                <a:spcPts val="0"/>
+              </a:spcBef>
+              <a:spcAft>
+                <a:spcPts val="0"/>
+              </a:spcAft>
+              <a:buNone/>
+            </a:pPr>
+            <a:r>
+              <a:rPr lang="en-US" sz="2400" dirty="0">
                 <a:solidFill>
                   <a:schemeClr val="dk1"/>
                 </a:solidFill>
@@ -15260,7 +15286,7 @@
               </a:rPr>
               <a:t>With the for loop we can execute a set of statements, once for each item in a list, tuple, set etc.</a:t>
             </a:r>
-            <a:endParaRPr sz="2400">
+            <a:endParaRPr sz="2400" dirty="0">
               <a:solidFill>
                 <a:schemeClr val="dk1"/>
               </a:solidFill>
@@ -15287,8 +15313,8 @@
         </p:blipFill>
         <p:spPr>
           <a:xfrm>
-            <a:off x="1" y="3276600"/>
-            <a:ext cx="9144000" cy="2333625"/>
+            <a:off x="75415" y="3785611"/>
+            <a:ext cx="8382785" cy="1889289"/>
           </a:xfrm>
           <a:prstGeom prst="rect">
             <a:avLst/>
@@ -15307,7 +15333,7 @@
         </p:nvSpPr>
         <p:spPr>
           <a:xfrm>
-            <a:off x="0" y="5657671"/>
+            <a:off x="75415" y="5761366"/>
             <a:ext cx="8458200" cy="1384995"/>
           </a:xfrm>
           <a:prstGeom prst="rect">
@@ -15339,7 +15365,7 @@
               <a:buChar char="⮚"/>
             </a:pPr>
             <a:r>
-              <a:rPr lang="en-US" sz="2400">
+              <a:rPr lang="en-US" sz="2400" dirty="0">
                 <a:solidFill>
                   <a:schemeClr val="dk1"/>
                 </a:solidFill>
@@ -15350,7 +15376,7 @@
               </a:rPr>
               <a:t> The for loop does not require an indexing variable to set beforehand.</a:t>
             </a:r>
-            <a:endParaRPr/>
+            <a:endParaRPr dirty="0"/>
           </a:p>
           <a:p>
             <a:pPr marL="0" marR="0" lvl="0" indent="0" algn="l" rtl="0">
@@ -15363,7 +15389,7 @@
               <a:buNone/>
             </a:pPr>
             <a:br>
-              <a:rPr lang="en-US" sz="1800">
+              <a:rPr lang="en-US" sz="1800" dirty="0">
                 <a:solidFill>
                   <a:schemeClr val="dk1"/>
                 </a:solidFill>
@@ -15373,7 +15399,7 @@
                 <a:sym typeface="Calibri"/>
               </a:rPr>
             </a:br>
-            <a:endParaRPr sz="1800">
+            <a:endParaRPr sz="1800" dirty="0">
               <a:solidFill>
                 <a:schemeClr val="dk1"/>
               </a:solidFill>
@@ -18415,8 +18441,8 @@
         </p:nvSpPr>
         <p:spPr>
           <a:xfrm>
-            <a:off x="694063" y="330506"/>
-            <a:ext cx="4600940" cy="3108543"/>
+            <a:off x="694062" y="330506"/>
+            <a:ext cx="6449687" cy="3323987"/>
           </a:xfrm>
           <a:prstGeom prst="rect">
             <a:avLst/>
@@ -18424,7 +18450,7 @@
           <a:noFill/>
         </p:spPr>
         <p:txBody>
-          <a:bodyPr wrap="none" rtlCol="0">
+          <a:bodyPr wrap="square" rtlCol="0">
             <a:spAutoFit/>
           </a:bodyPr>
           <a:lstStyle/>
@@ -18440,14 +18466,25 @@
           <a:p>
             <a:r>
               <a:rPr lang="en-US" dirty="0"/>
-              <a:t>Q1. Iterate over a list in Python.</a:t>
-            </a:r>
+              <a:t>Q1. </a:t>
+            </a:r>
+            <a:r>
+              <a:rPr lang="en-US" b="1" dirty="0"/>
+              <a:t>Iterate over a list in Python.</a:t>
+            </a:r>
+          </a:p>
+          <a:p>
+            <a:endParaRPr lang="en-US" b="1" dirty="0"/>
           </a:p>
           <a:p>
             <a:pPr fontAlgn="base"/>
             <a:r>
+              <a:rPr lang="en-US" b="1" dirty="0"/>
+              <a:t>Solution</a:t>
+            </a:r>
+            <a:r>
               <a:rPr lang="en-US" dirty="0"/>
-              <a:t>Solution : </a:t>
+              <a:t> : </a:t>
             </a:r>
           </a:p>
           <a:p>

</xml_diff>